<commit_message>
Update hoàn chỉnh slide + báo cáo chưa có demo
</commit_message>
<xml_diff>
--- a/Báo cáo cuối kỳ/5. Singleton/Slide.pptx
+++ b/Báo cáo cuối kỳ/5. Singleton/Slide.pptx
@@ -118,6 +118,11 @@
       </a:defRPr>
     </a:lvl9pPr>
   </p:defaultTextStyle>
+  <p:extLst>
+    <p:ext uri="{EFAFB233-063F-42B5-8137-9DF3F51BA10A}">
+      <p15:sldGuideLst xmlns:p15="http://schemas.microsoft.com/office/powerpoint/2012/main"/>
+    </p:ext>
+  </p:extLst>
 </p:presentation>
 </file>
 
@@ -298,7 +303,6 @@
               <a:rPr lang="en-US"/>
               <a:t>Fifth level</a:t>
             </a:r>
-            <a:endParaRPr lang="en-US"/>
           </a:p>
         </p:txBody>
       </p:sp>
@@ -6477,11 +6481,7 @@
           <a:p>
             <a:r>
               <a:rPr lang="en-US" b="1"/>
-              <a:t>H</a:t>
-            </a:r>
-            <a:r>
-              <a:rPr lang="en-US" b="1"/>
-              <a:t>ệ thống thực tế sử dụng</a:t>
+              <a:t>Hệ thống thực tế sử dụng</a:t>
             </a:r>
           </a:p>
         </p:txBody>
@@ -6503,11 +6503,7 @@
           <a:p>
             <a:r>
               <a:rPr lang="en-US"/>
-              <a:t>Singleton được sử dụng trong các hệ thống</a:t>
-            </a:r>
-            <a:r>
-              <a:rPr lang="en-US"/>
-              <a:t> </a:t>
+              <a:t>Singleton được sử dụng trong các hệ thống </a:t>
             </a:r>
             <a:r>
               <a:rPr lang="en-US">
@@ -6517,15 +6513,7 @@
             </a:r>
             <a:r>
               <a:rPr lang="en-US"/>
-              <a:t>, drivers objects, </a:t>
-            </a:r>
-            <a:r>
-              <a:rPr lang="en-US"/>
-              <a:t>caching và</a:t>
-            </a:r>
-            <a:r>
-              <a:rPr lang="en-US"/>
-              <a:t> </a:t>
+              <a:t>, drivers objects, caching và </a:t>
             </a:r>
             <a:r>
               <a:rPr lang="en-US">
@@ -6537,7 +6525,6 @@
               <a:rPr lang="en-US"/>
               <a:t>.</a:t>
             </a:r>
-            <a:endParaRPr lang="en-US"/>
           </a:p>
         </p:txBody>
       </p:sp>
@@ -6590,7 +6577,6 @@
               <a:rPr lang="en-US" b="1"/>
               <a:t>Các mẫu liên quan</a:t>
             </a:r>
-            <a:endParaRPr lang="en-US" b="1"/>
           </a:p>
         </p:txBody>
       </p:sp>
@@ -6799,11 +6785,7 @@
           <a:p>
             <a:r>
               <a:rPr lang="en-US" b="1"/>
-              <a:t>Mục đích, </a:t>
-            </a:r>
-            <a:r>
-              <a:rPr lang="en-US" b="1"/>
-              <a:t>ý định</a:t>
+              <a:t>Mục đích, ý định</a:t>
             </a:r>
             <a:r>
               <a:rPr lang="en-US"/>
@@ -6957,33 +6939,20 @@
             </a:r>
             <a:r>
               <a:rPr lang="vi-VN" b="1"/>
-              <a:t>kiểm </a:t>
-            </a:r>
-            <a:r>
-              <a:rPr lang="vi-VN" b="1"/>
-              <a:t>soát </a:t>
-            </a:r>
-            <a:r>
-              <a:rPr lang="en-US"/>
-              <a:t>việc </a:t>
-            </a:r>
-            <a:r>
-              <a:rPr lang="en-US"/>
-              <a:t>khởi tạo đối tượng của một</a:t>
+              <a:t>kiểm soát </a:t>
+            </a:r>
+            <a:r>
+              <a:rPr lang="en-US"/>
+              <a:t>việc khởi tạo đối tượng của một</a:t>
             </a:r>
             <a:r>
               <a:rPr lang="vi-VN"/>
-              <a:t> </a:t>
-            </a:r>
-            <a:r>
-              <a:rPr lang="vi-VN"/>
-              <a:t>lớp</a:t>
+              <a:t> lớp</a:t>
             </a:r>
             <a:r>
               <a:rPr lang="en-US"/>
               <a:t>.</a:t>
             </a:r>
-            <a:endParaRPr lang="en-US"/>
           </a:p>
           <a:p>
             <a:pPr lvl="0" fontAlgn="base"/>
@@ -7096,7 +7065,6 @@
               <a:rPr lang="en-US" b="1"/>
               <a:t>Khả năng ứng dụng</a:t>
             </a:r>
-            <a:endParaRPr lang="en-US" b="1"/>
           </a:p>
         </p:txBody>
       </p:sp>
@@ -7135,7 +7103,6 @@
               <a:rPr lang="en-US"/>
               <a:t>Xây dựng các thư viện hỗ trợ việc logging trong quá trình lập trình, …</a:t>
             </a:r>
-            <a:endParaRPr lang="en-US"/>
           </a:p>
           <a:p>
             <a:pPr lvl="1"/>
@@ -7198,7 +7165,6 @@
               <a:rPr lang="en-US" b="1"/>
               <a:t>Cấu trúc – Thành phần</a:t>
             </a:r>
-            <a:endParaRPr lang="en-US" b="1"/>
           </a:p>
         </p:txBody>
       </p:sp>
@@ -7245,45 +7211,20 @@
           <a:p>
             <a:r>
               <a:rPr lang="en-US"/>
-              <a:t>Chỉ có một lớp Singleton tham gia vào mẫu</a:t>
-            </a:r>
-            <a:r>
-              <a:rPr lang="en-US"/>
-              <a:t>. </a:t>
-            </a:r>
-          </a:p>
-          <a:p>
-            <a:r>
-              <a:rPr lang="en-US"/>
-              <a:t>Lớp </a:t>
-            </a:r>
-            <a:r>
-              <a:rPr lang="en-US"/>
-              <a:t>này phải định nghĩa hàm khởi tạo là private để ngăn việc khởi tạo thể hiện từ lớp này từ </a:t>
-            </a:r>
-            <a:r>
-              <a:rPr lang="en-US"/>
-              <a:t>bên ngoài.</a:t>
-            </a:r>
-          </a:p>
-          <a:p>
-            <a:r>
-              <a:rPr lang="en-US"/>
-              <a:t>Đ</a:t>
-            </a:r>
-            <a:r>
-              <a:rPr lang="en-US"/>
-              <a:t>ồng thời phải </a:t>
-            </a:r>
-            <a:r>
-              <a:rPr lang="en-US"/>
-              <a:t>có hàm getInstace() để </a:t>
-            </a:r>
-            <a:r>
-              <a:rPr lang="en-US"/>
-              <a:t>trả một đối tượng của lớp Singleton.</a:t>
-            </a:r>
-            <a:endParaRPr lang="en-US"/>
+              <a:t>Chỉ có một lớp Singleton tham gia vào mẫu. </a:t>
+            </a:r>
+          </a:p>
+          <a:p>
+            <a:r>
+              <a:rPr lang="en-US"/>
+              <a:t>Lớp này phải định nghĩa hàm khởi tạo là private để ngăn việc khởi tạo thể hiện từ lớp này từ bên ngoài.</a:t>
+            </a:r>
+          </a:p>
+          <a:p>
+            <a:r>
+              <a:rPr lang="en-US"/>
+              <a:t>Đồng thời phải có hàm getInstace() để trả một đối tượng của lớp Singleton.</a:t>
+            </a:r>
           </a:p>
           <a:p>
             <a:endParaRPr lang="en-US"/>
@@ -7360,11 +7301,7 @@
             <a:pPr lvl="0" fontAlgn="base"/>
             <a:r>
               <a:rPr lang="en-US"/>
-              <a:t>Hàm </a:t>
-            </a:r>
-            <a:r>
-              <a:rPr lang="en-US"/>
-              <a:t>khởi tạo của lớp Singleton được định nghĩa thành </a:t>
+              <a:t>Hàm khởi tạo của lớp Singleton được định nghĩa thành </a:t>
             </a:r>
             <a:r>
               <a:rPr lang="en-US">
@@ -7388,23 +7325,7 @@
             </a:r>
             <a:r>
               <a:rPr lang="en-US"/>
-              <a:t> </a:t>
-            </a:r>
-            <a:r>
-              <a:rPr lang="en-US"/>
-              <a:t>để client không </a:t>
-            </a:r>
-            <a:r>
-              <a:rPr lang="en-US"/>
-              <a:t>thể </a:t>
-            </a:r>
-            <a:r>
-              <a:rPr lang="en-US"/>
-              <a:t>tạo đối tượng của </a:t>
-            </a:r>
-            <a:r>
-              <a:rPr lang="en-US"/>
-              <a:t>lớp trực tiếp từ bên ngoài.</a:t>
+              <a:t> để client không thể tạo đối tượng của lớp trực tiếp từ bên ngoài.</a:t>
             </a:r>
           </a:p>
           <a:p>
@@ -7468,7 +7389,6 @@
               <a:rPr lang="en-US"/>
               <a:t>đó cho client.</a:t>
             </a:r>
-            <a:endParaRPr lang="en-US"/>
           </a:p>
         </p:txBody>
       </p:sp>
@@ -7602,6 +7522,20 @@
           <a:bodyPr/>
           <a:lstStyle/>
           <a:p>
+            <a:pPr lvl="0" fontAlgn="base"/>
+            <a:r>
+              <a:rPr lang="en-US"/>
+              <a:t>Giới hạn số lượng thể hiện của lớp ở một con số nào đó, con số này phải có ý nghĩa nhất định trong chương trình của chúng ta.</a:t>
+            </a:r>
+          </a:p>
+          <a:p>
+            <a:pPr lvl="0" fontAlgn="base"/>
+            <a:r>
+              <a:rPr lang="en-US"/>
+              <a:t>Nếu một lớp là Singleton, chúng ta có thể gặp khó khăn khi tạo lớp con của lớp đó.</a:t>
+            </a:r>
+          </a:p>
+          <a:p>
             <a:endParaRPr lang="en-US"/>
           </a:p>
         </p:txBody>
@@ -7695,17 +7629,8 @@
             <a:pPr lvl="1"/>
             <a:r>
               <a:rPr lang="en-US"/>
-              <a:t>Dùng</a:t>
-            </a:r>
-            <a:r>
-              <a:rPr lang="en-US"/>
-              <a:t> </a:t>
-            </a:r>
-            <a:r>
-              <a:rPr lang="en-US"/>
-              <a:t>Static Initialization.</a:t>
-            </a:r>
-            <a:endParaRPr lang="en-US"/>
+              <a:t>Dùng Static Initialization.</a:t>
+            </a:r>
           </a:p>
           <a:p>
             <a:r>

</xml_diff>